<commit_message>
improved keep upper blade, need cutting plane
</commit_message>
<xml_diff>
--- a/Gantt_Chart.pptx
+++ b/Gantt_Chart.pptx
@@ -226,7 +226,7 @@
           <a:p>
             <a:fld id="{5C0F00CE-9AD9-480E-8111-6DE11AA586CD}" type="datetimeFigureOut">
               <a:rPr lang="fr-FR" smtClean="0"/>
-              <a:t>27/09/2018</a:t>
+              <a:t>01/10/2018</a:t>
             </a:fld>
             <a:endParaRPr lang="fr-FR" dirty="0"/>
           </a:p>
@@ -403,7 +403,7 @@
           <a:p>
             <a:fld id="{85405035-5005-47CB-816B-73034E0515D9}" type="datetimeFigureOut">
               <a:rPr lang="fr-FR" noProof="0" smtClean="0"/>
-              <a:t>27/09/2018</a:t>
+              <a:t>01/10/2018</a:t>
             </a:fld>
             <a:endParaRPr lang="fr-FR" noProof="0"/>
           </a:p>
@@ -1847,7 +1847,7 @@
           <p:nvPr>
             <p:extLst>
               <p:ext uri="{D42A27DB-BD31-4B8C-83A1-F6EECF244321}">
-                <p14:modId xmlns:p14="http://schemas.microsoft.com/office/powerpoint/2010/main" val="1334563437"/>
+                <p14:modId xmlns:p14="http://schemas.microsoft.com/office/powerpoint/2010/main" val="3350065684"/>
               </p:ext>
             </p:extLst>
           </p:nvPr>
@@ -7740,7 +7740,7 @@
                   </a:ext>
                 </a:extLst>
               </a:tr>
-              <a:tr h="398276">
+              <a:tr h="131924">
                 <a:tc>
                   <a:txBody>
                     <a:bodyPr/>
@@ -12470,8 +12470,8 @@
         </p:nvSpPr>
         <p:spPr bwMode="auto">
           <a:xfrm>
-            <a:off x="2507744" y="3014228"/>
-            <a:ext cx="1346548" cy="315434"/>
+            <a:off x="2639616" y="3014228"/>
+            <a:ext cx="1152128" cy="315434"/>
           </a:xfrm>
           <a:prstGeom prst="rect">
             <a:avLst/>
@@ -12527,8 +12527,8 @@
         </p:nvSpPr>
         <p:spPr bwMode="auto">
           <a:xfrm>
-            <a:off x="2002130" y="2614115"/>
-            <a:ext cx="709494" cy="315434"/>
+            <a:off x="2135560" y="2614115"/>
+            <a:ext cx="720080" cy="315434"/>
           </a:xfrm>
           <a:prstGeom prst="rect">
             <a:avLst/>
@@ -13048,7 +13048,7 @@
         </p:nvSpPr>
         <p:spPr bwMode="auto">
           <a:xfrm>
-            <a:off x="3678900" y="3429000"/>
+            <a:off x="3423851" y="3429000"/>
             <a:ext cx="1224136" cy="315434"/>
           </a:xfrm>
           <a:prstGeom prst="rect">
@@ -13111,7 +13111,7 @@
         </p:nvSpPr>
         <p:spPr bwMode="auto">
           <a:xfrm>
-            <a:off x="4647987" y="3843772"/>
+            <a:off x="4625094" y="3837809"/>
             <a:ext cx="1368152" cy="315434"/>
           </a:xfrm>
           <a:prstGeom prst="rect">
@@ -13239,7 +13239,7 @@
         </p:nvSpPr>
         <p:spPr bwMode="auto">
           <a:xfrm>
-            <a:off x="7021099" y="4813942"/>
+            <a:off x="7032104" y="4813942"/>
             <a:ext cx="360040" cy="315434"/>
           </a:xfrm>
           <a:prstGeom prst="rect">

</xml_diff>